<commit_message>
update lucene sharing ppt
</commit_message>
<xml_diff>
--- a/uml/Lucene索引过程分享.pptx
+++ b/uml/Lucene索引过程分享.pptx
@@ -7,6 +7,15 @@
   <p:sldIdLst>
     <p:sldId id="256" r:id="rId2"/>
     <p:sldId id="257" r:id="rId3"/>
+    <p:sldId id="258" r:id="rId4"/>
+    <p:sldId id="259" r:id="rId5"/>
+    <p:sldId id="260" r:id="rId6"/>
+    <p:sldId id="261" r:id="rId7"/>
+    <p:sldId id="262" r:id="rId8"/>
+    <p:sldId id="263" r:id="rId9"/>
+    <p:sldId id="264" r:id="rId10"/>
+    <p:sldId id="265" r:id="rId11"/>
+    <p:sldId id="266" r:id="rId12"/>
   </p:sldIdLst>
   <p:sldSz cx="12192000" cy="6858000"/>
   <p:notesSz cx="6858000" cy="9144000"/>
@@ -105,6 +114,11 @@
       </a:defRPr>
     </a:lvl9pPr>
   </p:defaultTextStyle>
+  <p:extLst>
+    <p:ext uri="{EFAFB233-063F-42B5-8137-9DF3F51BA10A}">
+      <p15:sldGuideLst xmlns:p15="http://schemas.microsoft.com/office/powerpoint/2012/main"/>
+    </p:ext>
+  </p:extLst>
 </p:presentation>
 </file>
 
@@ -278,7 +292,7 @@
             <a:fld id="{87DE6118-2437-4B30-8E3C-4D2BE6020583}" type="datetimeFigureOut">
               <a:rPr lang="en-US" dirty="0"/>
               <a:pPr/>
-              <a:t>11/7/22</a:t>
+              <a:t>11/11/22</a:t>
             </a:fld>
             <a:endParaRPr lang="en-US" dirty="0"/>
           </a:p>
@@ -604,7 +618,7 @@
           <a:p>
             <a:fld id="{87DE6118-2437-4B30-8E3C-4D2BE6020583}" type="datetimeFigureOut">
               <a:rPr lang="en-US" dirty="0"/>
-              <a:t>11/7/22</a:t>
+              <a:t>11/11/22</a:t>
             </a:fld>
             <a:endParaRPr lang="en-US" dirty="0"/>
           </a:p>
@@ -779,7 +793,7 @@
           <a:p>
             <a:fld id="{87DE6118-2437-4B30-8E3C-4D2BE6020583}" type="datetimeFigureOut">
               <a:rPr lang="en-US" dirty="0"/>
-              <a:t>11/7/22</a:t>
+              <a:t>11/11/22</a:t>
             </a:fld>
             <a:endParaRPr lang="en-US" dirty="0"/>
           </a:p>
@@ -944,7 +958,7 @@
           <a:p>
             <a:fld id="{87DE6118-2437-4B30-8E3C-4D2BE6020583}" type="datetimeFigureOut">
               <a:rPr lang="en-US" dirty="0"/>
-              <a:t>11/7/22</a:t>
+              <a:t>11/11/22</a:t>
             </a:fld>
             <a:endParaRPr lang="en-US" dirty="0"/>
           </a:p>
@@ -1217,7 +1231,7 @@
             <a:fld id="{87DE6118-2437-4B30-8E3C-4D2BE6020583}" type="datetimeFigureOut">
               <a:rPr lang="en-US" dirty="0"/>
               <a:pPr/>
-              <a:t>11/7/22</a:t>
+              <a:t>11/11/22</a:t>
             </a:fld>
             <a:endParaRPr lang="en-US" dirty="0"/>
           </a:p>
@@ -1607,7 +1621,7 @@
           <a:p>
             <a:fld id="{87DE6118-2437-4B30-8E3C-4D2BE6020583}" type="datetimeFigureOut">
               <a:rPr lang="en-US" dirty="0"/>
-              <a:t>11/7/22</a:t>
+              <a:t>11/11/22</a:t>
             </a:fld>
             <a:endParaRPr lang="en-US" dirty="0"/>
           </a:p>
@@ -2079,7 +2093,7 @@
           <a:p>
             <a:fld id="{87DE6118-2437-4B30-8E3C-4D2BE6020583}" type="datetimeFigureOut">
               <a:rPr lang="en-US" dirty="0"/>
-              <a:t>11/7/22</a:t>
+              <a:t>11/11/22</a:t>
             </a:fld>
             <a:endParaRPr lang="en-US" dirty="0"/>
           </a:p>
@@ -2192,7 +2206,7 @@
           <a:p>
             <a:fld id="{87DE6118-2437-4B30-8E3C-4D2BE6020583}" type="datetimeFigureOut">
               <a:rPr lang="en-US" dirty="0"/>
-              <a:t>11/7/22</a:t>
+              <a:t>11/11/22</a:t>
             </a:fld>
             <a:endParaRPr lang="en-US" dirty="0"/>
           </a:p>
@@ -2282,7 +2296,7 @@
           <a:p>
             <a:fld id="{87DE6118-2437-4B30-8E3C-4D2BE6020583}" type="datetimeFigureOut">
               <a:rPr lang="en-US" dirty="0"/>
-              <a:t>11/7/22</a:t>
+              <a:t>11/11/22</a:t>
             </a:fld>
             <a:endParaRPr lang="en-US" dirty="0"/>
           </a:p>
@@ -2624,7 +2638,7 @@
             <a:fld id="{87DE6118-2437-4B30-8E3C-4D2BE6020583}" type="datetimeFigureOut">
               <a:rPr lang="en-US" dirty="0"/>
               <a:pPr/>
-              <a:t>11/7/22</a:t>
+              <a:t>11/11/22</a:t>
             </a:fld>
             <a:endParaRPr lang="en-US" dirty="0"/>
           </a:p>
@@ -3009,7 +3023,7 @@
             <a:fld id="{87DE6118-2437-4B30-8E3C-4D2BE6020583}" type="datetimeFigureOut">
               <a:rPr lang="en-US" dirty="0"/>
               <a:pPr/>
-              <a:t>11/7/22</a:t>
+              <a:t>11/11/22</a:t>
             </a:fld>
             <a:endParaRPr lang="en-US" dirty="0"/>
           </a:p>
@@ -3284,7 +3298,7 @@
             <a:fld id="{87DE6118-2437-4B30-8E3C-4D2BE6020583}" type="datetimeFigureOut">
               <a:rPr lang="en-US" dirty="0"/>
               <a:pPr/>
-              <a:t>11/7/22</a:t>
+              <a:t>11/11/22</a:t>
             </a:fld>
             <a:endParaRPr lang="en-US" dirty="0"/>
           </a:p>
@@ -3814,19 +3828,29 @@
           <a:lstStyle/>
           <a:p>
             <a:r>
-              <a:rPr lang="en-US" altLang="zh-CN" dirty="0">
-                <a:latin typeface="Andale Mono" panose="020B0509000000000004" pitchFamily="49" charset="0"/>
+              <a:rPr lang="en-US" sz="6000" cap="none" dirty="0" err="1">
+                <a:latin typeface="Calibri" panose="020F0502020204030204" pitchFamily="34" charset="0"/>
+                <a:cs typeface="Calibri" panose="020F0502020204030204" pitchFamily="34" charset="0"/>
               </a:rPr>
-              <a:t>Lucene</a:t>
-            </a:r>
-            <a:r>
-              <a:rPr lang="zh-CN" altLang="en-US" dirty="0">
-                <a:latin typeface="Andale Mono" panose="020B0509000000000004" pitchFamily="49" charset="0"/>
+              <a:t>L</a:t>
+            </a:r>
+            <a:r>
+              <a:rPr lang="en-US" altLang="zh-CN" sz="6000" cap="none" dirty="0" err="1">
+                <a:latin typeface="Calibri" panose="020F0502020204030204" pitchFamily="34" charset="0"/>
+                <a:cs typeface="Calibri" panose="020F0502020204030204" pitchFamily="34" charset="0"/>
+              </a:rPr>
+              <a:t>ucene</a:t>
+            </a:r>
+            <a:r>
+              <a:rPr lang="en-US" sz="6000" cap="none" dirty="0" err="1">
+                <a:latin typeface="Calibri" panose="020F0502020204030204" pitchFamily="34" charset="0"/>
+                <a:cs typeface="Calibri" panose="020F0502020204030204" pitchFamily="34" charset="0"/>
               </a:rPr>
               <a:t>索引过程分享</a:t>
             </a:r>
-            <a:endParaRPr lang="en-CN" dirty="0">
-              <a:latin typeface="Andale Mono" panose="020B0509000000000004" pitchFamily="49" charset="0"/>
+            <a:endParaRPr lang="en-CN" sz="6000" cap="none" dirty="0">
+              <a:latin typeface="Calibri" panose="020F0502020204030204" pitchFamily="34" charset="0"/>
+              <a:cs typeface="Calibri" panose="020F0502020204030204" pitchFamily="34" charset="0"/>
             </a:endParaRPr>
           </a:p>
         </p:txBody>
@@ -3852,7 +3876,35 @@
           <a:bodyPr/>
           <a:lstStyle/>
           <a:p>
-            <a:endParaRPr lang="en-CN"/>
+            <a:r>
+              <a:rPr lang="en-CN" dirty="0"/>
+              <a:t>OpenAPI</a:t>
+            </a:r>
+            <a:r>
+              <a:rPr lang="zh-CN" altLang="en-US" dirty="0"/>
+              <a:t> </a:t>
+            </a:r>
+            <a:r>
+              <a:rPr lang="en-US" altLang="zh-CN" dirty="0"/>
+              <a:t>-</a:t>
+            </a:r>
+            <a:r>
+              <a:rPr lang="zh-CN" altLang="en-US" dirty="0"/>
+              <a:t> </a:t>
+            </a:r>
+            <a:r>
+              <a:rPr lang="en-CN" dirty="0"/>
+              <a:t>Kolt</a:t>
+            </a:r>
+            <a:r>
+              <a:rPr lang="zh-CN" altLang="en-US" dirty="0"/>
+              <a:t> </a:t>
+            </a:r>
+            <a:r>
+              <a:rPr lang="en-US" altLang="zh-CN" dirty="0"/>
+              <a:t>Wang</a:t>
+            </a:r>
+            <a:endParaRPr lang="en-CN" dirty="0"/>
           </a:p>
         </p:txBody>
       </p:sp>
@@ -3860,6 +3912,153 @@
     <p:extLst>
       <p:ext uri="{BB962C8B-B14F-4D97-AF65-F5344CB8AC3E}">
         <p14:creationId xmlns:p14="http://schemas.microsoft.com/office/powerpoint/2010/main" val="2876761668"/>
+      </p:ext>
+    </p:extLst>
+  </p:cSld>
+  <p:clrMapOvr>
+    <a:masterClrMapping/>
+  </p:clrMapOvr>
+</p:sld>
+</file>
+
+<file path=ppt/slides/slide10.xml><?xml version="1.0" encoding="utf-8"?>
+<p:sld xmlns:a="http://schemas.openxmlformats.org/drawingml/2006/main" xmlns:r="http://schemas.openxmlformats.org/officeDocument/2006/relationships" xmlns:p="http://schemas.openxmlformats.org/presentationml/2006/main">
+  <p:cSld>
+    <p:spTree>
+      <p:nvGrpSpPr>
+        <p:cNvPr id="1" name=""/>
+        <p:cNvGrpSpPr/>
+        <p:nvPr/>
+      </p:nvGrpSpPr>
+      <p:grpSpPr>
+        <a:xfrm>
+          <a:off x="0" y="0"/>
+          <a:ext cx="0" cy="0"/>
+          <a:chOff x="0" y="0"/>
+          <a:chExt cx="0" cy="0"/>
+        </a:xfrm>
+      </p:grpSpPr>
+      <p:sp>
+        <p:nvSpPr>
+          <p:cNvPr id="2" name="Title 1">
+            <a:extLst>
+              <a:ext uri="{FF2B5EF4-FFF2-40B4-BE49-F238E27FC236}">
+                <a16:creationId xmlns:a16="http://schemas.microsoft.com/office/drawing/2014/main" id="{70843433-E35D-4D83-F5C8-E8B73062DB80}"/>
+              </a:ext>
+            </a:extLst>
+          </p:cNvPr>
+          <p:cNvSpPr>
+            <a:spLocks noGrp="1"/>
+          </p:cNvSpPr>
+          <p:nvPr>
+            <p:ph type="title"/>
+          </p:nvPr>
+        </p:nvSpPr>
+        <p:spPr/>
+        <p:txBody>
+          <a:bodyPr/>
+          <a:lstStyle/>
+          <a:p>
+            <a:r>
+              <a:rPr lang="en-CN" dirty="0"/>
+              <a:t>Q&amp;A</a:t>
+            </a:r>
+          </a:p>
+        </p:txBody>
+      </p:sp>
+      <p:sp>
+        <p:nvSpPr>
+          <p:cNvPr id="3" name="Content Placeholder 2">
+            <a:extLst>
+              <a:ext uri="{FF2B5EF4-FFF2-40B4-BE49-F238E27FC236}">
+                <a16:creationId xmlns:a16="http://schemas.microsoft.com/office/drawing/2014/main" id="{D4911B78-D471-3250-7407-A224838D7CBB}"/>
+              </a:ext>
+            </a:extLst>
+          </p:cNvPr>
+          <p:cNvSpPr>
+            <a:spLocks noGrp="1"/>
+          </p:cNvSpPr>
+          <p:nvPr>
+            <p:ph idx="1"/>
+          </p:nvPr>
+        </p:nvSpPr>
+        <p:spPr/>
+        <p:txBody>
+          <a:bodyPr/>
+          <a:lstStyle/>
+          <a:p>
+            <a:endParaRPr lang="en-CN" dirty="0"/>
+          </a:p>
+        </p:txBody>
+      </p:sp>
+    </p:spTree>
+    <p:extLst>
+      <p:ext uri="{BB962C8B-B14F-4D97-AF65-F5344CB8AC3E}">
+        <p14:creationId xmlns:p14="http://schemas.microsoft.com/office/powerpoint/2010/main" val="1365090610"/>
+      </p:ext>
+    </p:extLst>
+  </p:cSld>
+  <p:clrMapOvr>
+    <a:masterClrMapping/>
+  </p:clrMapOvr>
+</p:sld>
+</file>
+
+<file path=ppt/slides/slide11.xml><?xml version="1.0" encoding="utf-8"?>
+<p:sld xmlns:a="http://schemas.openxmlformats.org/drawingml/2006/main" xmlns:r="http://schemas.openxmlformats.org/officeDocument/2006/relationships" xmlns:p="http://schemas.openxmlformats.org/presentationml/2006/main">
+  <p:cSld>
+    <p:spTree>
+      <p:nvGrpSpPr>
+        <p:cNvPr id="1" name=""/>
+        <p:cNvGrpSpPr/>
+        <p:nvPr/>
+      </p:nvGrpSpPr>
+      <p:grpSpPr>
+        <a:xfrm>
+          <a:off x="0" y="0"/>
+          <a:ext cx="0" cy="0"/>
+          <a:chOff x="0" y="0"/>
+          <a:chExt cx="0" cy="0"/>
+        </a:xfrm>
+      </p:grpSpPr>
+      <p:sp>
+        <p:nvSpPr>
+          <p:cNvPr id="2" name="Title 1">
+            <a:extLst>
+              <a:ext uri="{FF2B5EF4-FFF2-40B4-BE49-F238E27FC236}">
+                <a16:creationId xmlns:a16="http://schemas.microsoft.com/office/drawing/2014/main" id="{0FAE169E-148A-2A81-1BAB-6FB2A0F5F520}"/>
+              </a:ext>
+            </a:extLst>
+          </p:cNvPr>
+          <p:cNvSpPr>
+            <a:spLocks noGrp="1"/>
+          </p:cNvSpPr>
+          <p:nvPr>
+            <p:ph type="title"/>
+          </p:nvPr>
+        </p:nvSpPr>
+        <p:spPr>
+          <a:xfrm>
+            <a:off x="1295400" y="3249538"/>
+            <a:ext cx="9601200" cy="1485900"/>
+          </a:xfrm>
+        </p:spPr>
+        <p:txBody>
+          <a:bodyPr/>
+          <a:lstStyle/>
+          <a:p>
+            <a:pPr algn="ctr"/>
+            <a:r>
+              <a:rPr lang="en-CN" dirty="0"/>
+              <a:t>Thanks</a:t>
+            </a:r>
+          </a:p>
+        </p:txBody>
+      </p:sp>
+    </p:spTree>
+    <p:extLst>
+      <p:ext uri="{BB962C8B-B14F-4D97-AF65-F5344CB8AC3E}">
+        <p14:creationId xmlns:p14="http://schemas.microsoft.com/office/powerpoint/2010/main" val="2530155024"/>
       </p:ext>
     </p:extLst>
   </p:cSld>
@@ -3908,9 +4107,10 @@
           <a:lstStyle/>
           <a:p>
             <a:r>
-              <a:rPr lang="en-CN" dirty="0"/>
-              <a:t>内容</a:t>
-            </a:r>
+              <a:rPr lang="en-US" dirty="0" err="1"/>
+              <a:t>大纲</a:t>
+            </a:r>
+            <a:endParaRPr lang="en-CN" dirty="0"/>
           </a:p>
         </p:txBody>
       </p:sp>
@@ -3946,37 +4146,26 @@
           </a:p>
           <a:p>
             <a:r>
-              <a:rPr lang="en-CN" dirty="0"/>
-              <a:t>概念</a:t>
-            </a:r>
-          </a:p>
-          <a:p>
-            <a:r>
-              <a:rPr lang="en-CN" dirty="0"/>
-              <a:t>工具类</a:t>
-            </a:r>
-            <a:r>
-              <a:rPr lang="zh-CN" altLang="en-US" dirty="0"/>
-              <a:t>：</a:t>
+              <a:rPr lang="en-US" dirty="0" err="1"/>
+              <a:t>背景知识</a:t>
+            </a:r>
+            <a:endParaRPr lang="en-CN" dirty="0"/>
+          </a:p>
+          <a:p>
+            <a:r>
+              <a:rPr lang="en-US" dirty="0" err="1"/>
+              <a:t>索引流程</a:t>
             </a:r>
             <a:r>
               <a:rPr lang="en-US" altLang="zh-CN" dirty="0" err="1"/>
-              <a:t>BitSet</a:t>
-            </a:r>
-            <a:r>
-              <a:rPr lang="zh-CN" altLang="en-US" dirty="0"/>
-              <a:t>，</a:t>
-            </a:r>
-            <a:r>
-              <a:rPr lang="en-US" altLang="zh-CN" dirty="0" err="1"/>
-              <a:t>BytePool</a:t>
+              <a:t>overall</a:t>
             </a:r>
             <a:endParaRPr lang="en-US" altLang="zh-CN" dirty="0"/>
           </a:p>
           <a:p>
             <a:r>
               <a:rPr lang="en-US" dirty="0" err="1"/>
-              <a:t>增删改</a:t>
+              <a:t>文档的增删改</a:t>
             </a:r>
             <a:endParaRPr lang="en-US" dirty="0"/>
           </a:p>
@@ -4015,6 +4204,901 @@
     <p:extLst>
       <p:ext uri="{BB962C8B-B14F-4D97-AF65-F5344CB8AC3E}">
         <p14:creationId xmlns:p14="http://schemas.microsoft.com/office/powerpoint/2010/main" val="3726586867"/>
+      </p:ext>
+    </p:extLst>
+  </p:cSld>
+  <p:clrMapOvr>
+    <a:masterClrMapping/>
+  </p:clrMapOvr>
+</p:sld>
+</file>
+
+<file path=ppt/slides/slide3.xml><?xml version="1.0" encoding="utf-8"?>
+<p:sld xmlns:a="http://schemas.openxmlformats.org/drawingml/2006/main" xmlns:r="http://schemas.openxmlformats.org/officeDocument/2006/relationships" xmlns:p="http://schemas.openxmlformats.org/presentationml/2006/main">
+  <p:cSld>
+    <p:spTree>
+      <p:nvGrpSpPr>
+        <p:cNvPr id="1" name=""/>
+        <p:cNvGrpSpPr/>
+        <p:nvPr/>
+      </p:nvGrpSpPr>
+      <p:grpSpPr>
+        <a:xfrm>
+          <a:off x="0" y="0"/>
+          <a:ext cx="0" cy="0"/>
+          <a:chOff x="0" y="0"/>
+          <a:chExt cx="0" cy="0"/>
+        </a:xfrm>
+      </p:grpSpPr>
+      <p:sp>
+        <p:nvSpPr>
+          <p:cNvPr id="2" name="Title 1">
+            <a:extLst>
+              <a:ext uri="{FF2B5EF4-FFF2-40B4-BE49-F238E27FC236}">
+                <a16:creationId xmlns:a16="http://schemas.microsoft.com/office/drawing/2014/main" id="{EBEBA1E9-F8E1-D458-D4B1-58788E73D203}"/>
+              </a:ext>
+            </a:extLst>
+          </p:cNvPr>
+          <p:cNvSpPr>
+            <a:spLocks noGrp="1"/>
+          </p:cNvSpPr>
+          <p:nvPr>
+            <p:ph type="title"/>
+          </p:nvPr>
+        </p:nvSpPr>
+        <p:spPr/>
+        <p:txBody>
+          <a:bodyPr/>
+          <a:lstStyle/>
+          <a:p>
+            <a:r>
+              <a:rPr lang="en-CN" dirty="0"/>
+              <a:t>Lucene和Elasticsearch</a:t>
+            </a:r>
+          </a:p>
+        </p:txBody>
+      </p:sp>
+      <p:sp>
+        <p:nvSpPr>
+          <p:cNvPr id="3" name="Content Placeholder 2">
+            <a:extLst>
+              <a:ext uri="{FF2B5EF4-FFF2-40B4-BE49-F238E27FC236}">
+                <a16:creationId xmlns:a16="http://schemas.microsoft.com/office/drawing/2014/main" id="{E8EA4267-3FF3-D19D-8FAE-2D6A0CE27ADF}"/>
+              </a:ext>
+            </a:extLst>
+          </p:cNvPr>
+          <p:cNvSpPr>
+            <a:spLocks noGrp="1"/>
+          </p:cNvSpPr>
+          <p:nvPr>
+            <p:ph idx="1"/>
+          </p:nvPr>
+        </p:nvSpPr>
+        <p:spPr/>
+        <p:txBody>
+          <a:bodyPr/>
+          <a:lstStyle/>
+          <a:p>
+            <a:r>
+              <a:rPr lang="en-US" dirty="0"/>
+              <a:t>L</a:t>
+            </a:r>
+            <a:r>
+              <a:rPr lang="en-CN" dirty="0"/>
+              <a:t>ucene架构</a:t>
+            </a:r>
+          </a:p>
+          <a:p>
+            <a:r>
+              <a:rPr lang="en-CN" dirty="0"/>
+              <a:t>Elasticsearch架构</a:t>
+            </a:r>
+          </a:p>
+          <a:p>
+            <a:r>
+              <a:rPr lang="en-CN" dirty="0"/>
+              <a:t>Lucene和Elasticsearch的关系</a:t>
+            </a:r>
+          </a:p>
+        </p:txBody>
+      </p:sp>
+    </p:spTree>
+    <p:extLst>
+      <p:ext uri="{BB962C8B-B14F-4D97-AF65-F5344CB8AC3E}">
+        <p14:creationId xmlns:p14="http://schemas.microsoft.com/office/powerpoint/2010/main" val="3961508964"/>
+      </p:ext>
+    </p:extLst>
+  </p:cSld>
+  <p:clrMapOvr>
+    <a:masterClrMapping/>
+  </p:clrMapOvr>
+</p:sld>
+</file>
+
+<file path=ppt/slides/slide4.xml><?xml version="1.0" encoding="utf-8"?>
+<p:sld xmlns:a="http://schemas.openxmlformats.org/drawingml/2006/main" xmlns:r="http://schemas.openxmlformats.org/officeDocument/2006/relationships" xmlns:p="http://schemas.openxmlformats.org/presentationml/2006/main">
+  <p:cSld>
+    <p:spTree>
+      <p:nvGrpSpPr>
+        <p:cNvPr id="1" name=""/>
+        <p:cNvGrpSpPr/>
+        <p:nvPr/>
+      </p:nvGrpSpPr>
+      <p:grpSpPr>
+        <a:xfrm>
+          <a:off x="0" y="0"/>
+          <a:ext cx="0" cy="0"/>
+          <a:chOff x="0" y="0"/>
+          <a:chExt cx="0" cy="0"/>
+        </a:xfrm>
+      </p:grpSpPr>
+      <p:sp>
+        <p:nvSpPr>
+          <p:cNvPr id="2" name="Title 1">
+            <a:extLst>
+              <a:ext uri="{FF2B5EF4-FFF2-40B4-BE49-F238E27FC236}">
+                <a16:creationId xmlns:a16="http://schemas.microsoft.com/office/drawing/2014/main" id="{4029C5E1-6E62-95B3-AFDC-903271B52473}"/>
+              </a:ext>
+            </a:extLst>
+          </p:cNvPr>
+          <p:cNvSpPr>
+            <a:spLocks noGrp="1"/>
+          </p:cNvSpPr>
+          <p:nvPr>
+            <p:ph type="title"/>
+          </p:nvPr>
+        </p:nvSpPr>
+        <p:spPr/>
+        <p:txBody>
+          <a:bodyPr/>
+          <a:lstStyle/>
+          <a:p>
+            <a:r>
+              <a:rPr lang="en-CN" dirty="0"/>
+              <a:t>背景知识</a:t>
+            </a:r>
+          </a:p>
+        </p:txBody>
+      </p:sp>
+      <p:sp>
+        <p:nvSpPr>
+          <p:cNvPr id="3" name="Content Placeholder 2">
+            <a:extLst>
+              <a:ext uri="{FF2B5EF4-FFF2-40B4-BE49-F238E27FC236}">
+                <a16:creationId xmlns:a16="http://schemas.microsoft.com/office/drawing/2014/main" id="{3809E06B-30EF-0D48-DD4B-431F15485433}"/>
+              </a:ext>
+            </a:extLst>
+          </p:cNvPr>
+          <p:cNvSpPr>
+            <a:spLocks noGrp="1"/>
+          </p:cNvSpPr>
+          <p:nvPr>
+            <p:ph idx="1"/>
+          </p:nvPr>
+        </p:nvSpPr>
+        <p:spPr/>
+        <p:txBody>
+          <a:bodyPr/>
+          <a:lstStyle/>
+          <a:p>
+            <a:r>
+              <a:rPr lang="en-CN" dirty="0"/>
+              <a:t>日志结构存储与面向页存储</a:t>
+            </a:r>
+          </a:p>
+          <a:p>
+            <a:r>
+              <a:rPr lang="en-CN" dirty="0"/>
+              <a:t>索引</a:t>
+            </a:r>
+            <a:r>
+              <a:rPr lang="zh-CN" altLang="en-US" dirty="0"/>
+              <a:t>，</a:t>
+            </a:r>
+            <a:r>
+              <a:rPr lang="en-US" dirty="0" err="1"/>
+              <a:t>段</a:t>
+            </a:r>
+            <a:r>
+              <a:rPr lang="zh-CN" altLang="en-US" dirty="0"/>
+              <a:t>，</a:t>
+            </a:r>
+            <a:r>
+              <a:rPr lang="en-US" dirty="0" err="1"/>
+              <a:t>文档</a:t>
+            </a:r>
+            <a:r>
+              <a:rPr lang="zh-CN" altLang="en-US" dirty="0"/>
+              <a:t>，</a:t>
+            </a:r>
+            <a:r>
+              <a:rPr lang="en-US" dirty="0" err="1"/>
+              <a:t>域</a:t>
+            </a:r>
+            <a:r>
+              <a:rPr lang="zh-CN" altLang="en-US" dirty="0"/>
+              <a:t>，</a:t>
+            </a:r>
+            <a:r>
+              <a:rPr lang="en-US" dirty="0" err="1"/>
+              <a:t>词项</a:t>
+            </a:r>
+            <a:endParaRPr lang="en-US" altLang="zh-CN" dirty="0"/>
+          </a:p>
+          <a:p>
+            <a:r>
+              <a:rPr lang="en-US" altLang="zh-CN" dirty="0"/>
+              <a:t>postings</a:t>
+            </a:r>
+            <a:r>
+              <a:rPr lang="zh-CN" altLang="en-US" dirty="0"/>
+              <a:t>，</a:t>
+            </a:r>
+            <a:r>
+              <a:rPr lang="en-US" altLang="zh-CN" dirty="0" err="1"/>
+              <a:t>termVector</a:t>
+            </a:r>
+            <a:r>
+              <a:rPr lang="zh-CN" altLang="en-US" dirty="0"/>
+              <a:t>，</a:t>
+            </a:r>
+            <a:r>
+              <a:rPr lang="en-US" altLang="zh-CN" dirty="0" err="1"/>
+              <a:t>storedField</a:t>
+            </a:r>
+            <a:r>
+              <a:rPr lang="zh-CN" altLang="en-US" dirty="0"/>
+              <a:t>，</a:t>
+            </a:r>
+            <a:r>
+              <a:rPr lang="en-US" altLang="zh-CN" dirty="0"/>
+              <a:t>norm</a:t>
+            </a:r>
+            <a:r>
+              <a:rPr lang="zh-CN" altLang="en-US" dirty="0"/>
+              <a:t>，</a:t>
+            </a:r>
+            <a:r>
+              <a:rPr lang="en-US" altLang="zh-CN" dirty="0" err="1"/>
+              <a:t>docValue</a:t>
+            </a:r>
+            <a:r>
+              <a:rPr lang="zh-CN" altLang="en-US" dirty="0"/>
+              <a:t>，</a:t>
+            </a:r>
+            <a:r>
+              <a:rPr lang="en-US" altLang="zh-CN" dirty="0"/>
+              <a:t>point</a:t>
+            </a:r>
+          </a:p>
+          <a:p>
+            <a:r>
+              <a:rPr lang="en-US" altLang="zh-CN" dirty="0"/>
+              <a:t>Roaring</a:t>
+            </a:r>
+            <a:r>
+              <a:rPr lang="zh-CN" altLang="en-US" dirty="0"/>
+              <a:t> </a:t>
+            </a:r>
+            <a:r>
+              <a:rPr lang="en-US" altLang="zh-CN" dirty="0"/>
+              <a:t>Bitmap</a:t>
+            </a:r>
+            <a:r>
+              <a:rPr lang="zh-CN" altLang="en-US" dirty="0"/>
+              <a:t>，</a:t>
+            </a:r>
+            <a:r>
+              <a:rPr lang="en-CN" dirty="0"/>
+              <a:t>差值存储</a:t>
+            </a:r>
+            <a:r>
+              <a:rPr lang="zh-CN" altLang="en-US" dirty="0"/>
+              <a:t>，</a:t>
+            </a:r>
+            <a:r>
+              <a:rPr lang="en-CN" dirty="0"/>
+              <a:t>跳表</a:t>
+            </a:r>
+            <a:r>
+              <a:rPr lang="zh-CN" altLang="en-US" dirty="0"/>
+              <a:t>，</a:t>
+            </a:r>
+            <a:r>
+              <a:rPr lang="en-US" altLang="zh-CN" dirty="0"/>
+              <a:t>FST</a:t>
+            </a:r>
+            <a:r>
+              <a:rPr lang="zh-CN" altLang="en-US" dirty="0"/>
+              <a:t>，</a:t>
+            </a:r>
+            <a:r>
+              <a:rPr lang="en-US" altLang="zh-CN" dirty="0" err="1"/>
+              <a:t>ByteRefHash</a:t>
+            </a:r>
+            <a:r>
+              <a:rPr lang="en-US" altLang="zh-CN" dirty="0"/>
+              <a:t>,</a:t>
+            </a:r>
+            <a:r>
+              <a:rPr lang="zh-CN" altLang="en-US" dirty="0"/>
+              <a:t> </a:t>
+            </a:r>
+            <a:r>
+              <a:rPr lang="en-US" altLang="zh-CN" dirty="0" err="1"/>
+              <a:t>ByteBlockPool</a:t>
+            </a:r>
+            <a:r>
+              <a:rPr lang="zh-CN" altLang="en-US" dirty="0"/>
+              <a:t>，</a:t>
+            </a:r>
+            <a:r>
+              <a:rPr lang="en-US" altLang="zh-CN" dirty="0"/>
+              <a:t>Directory,</a:t>
+            </a:r>
+            <a:r>
+              <a:rPr lang="zh-CN" altLang="en-US" dirty="0"/>
+              <a:t> </a:t>
+            </a:r>
+            <a:r>
+              <a:rPr lang="en-US" altLang="zh-CN" dirty="0" err="1"/>
+              <a:t>RamUsageEstimator</a:t>
+            </a:r>
+            <a:r>
+              <a:rPr lang="en-US" altLang="zh-CN" dirty="0"/>
+              <a:t>, </a:t>
+            </a:r>
+            <a:r>
+              <a:rPr lang="en-US" altLang="zh-CN" dirty="0" err="1"/>
+              <a:t>IndexedDISI</a:t>
+            </a:r>
+            <a:endParaRPr lang="en-US" altLang="zh-CN" dirty="0"/>
+          </a:p>
+          <a:p>
+            <a:r>
+              <a:rPr lang="en-CN" dirty="0"/>
+              <a:t>缓冲区高速缓存</a:t>
+            </a:r>
+            <a:r>
+              <a:rPr lang="en-US" altLang="zh-CN" dirty="0"/>
+              <a:t>/</a:t>
+            </a:r>
+            <a:r>
+              <a:rPr lang="en-CN" dirty="0"/>
+              <a:t>内核缓冲</a:t>
+            </a:r>
+            <a:r>
+              <a:rPr lang="en-US" altLang="zh-CN" dirty="0"/>
+              <a:t>/Page</a:t>
+            </a:r>
+            <a:r>
+              <a:rPr lang="zh-CN" altLang="en-US" dirty="0"/>
+              <a:t> </a:t>
+            </a:r>
+            <a:r>
+              <a:rPr lang="en-US" altLang="zh-CN" dirty="0"/>
+              <a:t>Cache</a:t>
+            </a:r>
+          </a:p>
+          <a:p>
+            <a:endParaRPr lang="en-US" altLang="zh-CN" dirty="0"/>
+          </a:p>
+          <a:p>
+            <a:endParaRPr lang="en-US" altLang="zh-CN" dirty="0"/>
+          </a:p>
+          <a:p>
+            <a:endParaRPr lang="en-CN" dirty="0"/>
+          </a:p>
+        </p:txBody>
+      </p:sp>
+    </p:spTree>
+    <p:extLst>
+      <p:ext uri="{BB962C8B-B14F-4D97-AF65-F5344CB8AC3E}">
+        <p14:creationId xmlns:p14="http://schemas.microsoft.com/office/powerpoint/2010/main" val="4272423723"/>
+      </p:ext>
+    </p:extLst>
+  </p:cSld>
+  <p:clrMapOvr>
+    <a:masterClrMapping/>
+  </p:clrMapOvr>
+</p:sld>
+</file>
+
+<file path=ppt/slides/slide5.xml><?xml version="1.0" encoding="utf-8"?>
+<p:sld xmlns:a="http://schemas.openxmlformats.org/drawingml/2006/main" xmlns:r="http://schemas.openxmlformats.org/officeDocument/2006/relationships" xmlns:p="http://schemas.openxmlformats.org/presentationml/2006/main">
+  <p:cSld>
+    <p:spTree>
+      <p:nvGrpSpPr>
+        <p:cNvPr id="1" name=""/>
+        <p:cNvGrpSpPr/>
+        <p:nvPr/>
+      </p:nvGrpSpPr>
+      <p:grpSpPr>
+        <a:xfrm>
+          <a:off x="0" y="0"/>
+          <a:ext cx="0" cy="0"/>
+          <a:chOff x="0" y="0"/>
+          <a:chExt cx="0" cy="0"/>
+        </a:xfrm>
+      </p:grpSpPr>
+      <p:sp>
+        <p:nvSpPr>
+          <p:cNvPr id="2" name="Title 1">
+            <a:extLst>
+              <a:ext uri="{FF2B5EF4-FFF2-40B4-BE49-F238E27FC236}">
+                <a16:creationId xmlns:a16="http://schemas.microsoft.com/office/drawing/2014/main" id="{7AAE0CA5-A092-2D71-F551-9E2C13A30028}"/>
+              </a:ext>
+            </a:extLst>
+          </p:cNvPr>
+          <p:cNvSpPr>
+            <a:spLocks noGrp="1"/>
+          </p:cNvSpPr>
+          <p:nvPr>
+            <p:ph type="title"/>
+          </p:nvPr>
+        </p:nvSpPr>
+        <p:spPr/>
+        <p:txBody>
+          <a:bodyPr/>
+          <a:lstStyle/>
+          <a:p>
+            <a:r>
+              <a:rPr lang="en-CN" dirty="0"/>
+              <a:t>索引流程Overall</a:t>
+            </a:r>
+          </a:p>
+        </p:txBody>
+      </p:sp>
+      <p:sp>
+        <p:nvSpPr>
+          <p:cNvPr id="3" name="Content Placeholder 2">
+            <a:extLst>
+              <a:ext uri="{FF2B5EF4-FFF2-40B4-BE49-F238E27FC236}">
+                <a16:creationId xmlns:a16="http://schemas.microsoft.com/office/drawing/2014/main" id="{6D554D43-AAAF-E8DB-1FDB-9D9F2C8D388C}"/>
+              </a:ext>
+            </a:extLst>
+          </p:cNvPr>
+          <p:cNvSpPr>
+            <a:spLocks noGrp="1"/>
+          </p:cNvSpPr>
+          <p:nvPr>
+            <p:ph idx="1"/>
+          </p:nvPr>
+        </p:nvSpPr>
+        <p:spPr/>
+        <p:txBody>
+          <a:bodyPr/>
+          <a:lstStyle/>
+          <a:p>
+            <a:r>
+              <a:rPr lang="en-CN" dirty="0"/>
+              <a:t>整体索引流程</a:t>
+            </a:r>
+          </a:p>
+          <a:p>
+            <a:r>
+              <a:rPr lang="en-CN" dirty="0"/>
+              <a:t>主要类</a:t>
+            </a:r>
+            <a:r>
+              <a:rPr lang="zh-CN" altLang="en-US" dirty="0"/>
+              <a:t>，</a:t>
+            </a:r>
+            <a:r>
+              <a:rPr lang="en-CN" dirty="0"/>
+              <a:t>类图</a:t>
+            </a:r>
+            <a:r>
+              <a:rPr lang="zh-CN" altLang="en-US" dirty="0"/>
+              <a:t>，</a:t>
+            </a:r>
+            <a:r>
+              <a:rPr lang="en-CN" dirty="0"/>
+              <a:t>时序图</a:t>
+            </a:r>
+          </a:p>
+        </p:txBody>
+      </p:sp>
+    </p:spTree>
+    <p:extLst>
+      <p:ext uri="{BB962C8B-B14F-4D97-AF65-F5344CB8AC3E}">
+        <p14:creationId xmlns:p14="http://schemas.microsoft.com/office/powerpoint/2010/main" val="2946477913"/>
+      </p:ext>
+    </p:extLst>
+  </p:cSld>
+  <p:clrMapOvr>
+    <a:masterClrMapping/>
+  </p:clrMapOvr>
+</p:sld>
+</file>
+
+<file path=ppt/slides/slide6.xml><?xml version="1.0" encoding="utf-8"?>
+<p:sld xmlns:a="http://schemas.openxmlformats.org/drawingml/2006/main" xmlns:r="http://schemas.openxmlformats.org/officeDocument/2006/relationships" xmlns:p="http://schemas.openxmlformats.org/presentationml/2006/main">
+  <p:cSld>
+    <p:spTree>
+      <p:nvGrpSpPr>
+        <p:cNvPr id="1" name=""/>
+        <p:cNvGrpSpPr/>
+        <p:nvPr/>
+      </p:nvGrpSpPr>
+      <p:grpSpPr>
+        <a:xfrm>
+          <a:off x="0" y="0"/>
+          <a:ext cx="0" cy="0"/>
+          <a:chOff x="0" y="0"/>
+          <a:chExt cx="0" cy="0"/>
+        </a:xfrm>
+      </p:grpSpPr>
+      <p:sp>
+        <p:nvSpPr>
+          <p:cNvPr id="2" name="Title 1">
+            <a:extLst>
+              <a:ext uri="{FF2B5EF4-FFF2-40B4-BE49-F238E27FC236}">
+                <a16:creationId xmlns:a16="http://schemas.microsoft.com/office/drawing/2014/main" id="{0A5B9273-BCDE-C13B-17D3-FDF93EC1031D}"/>
+              </a:ext>
+            </a:extLst>
+          </p:cNvPr>
+          <p:cNvSpPr>
+            <a:spLocks noGrp="1"/>
+          </p:cNvSpPr>
+          <p:nvPr>
+            <p:ph type="title"/>
+          </p:nvPr>
+        </p:nvSpPr>
+        <p:spPr/>
+        <p:txBody>
+          <a:bodyPr/>
+          <a:lstStyle/>
+          <a:p>
+            <a:r>
+              <a:rPr lang="en-CN" dirty="0"/>
+              <a:t>文档的增删改</a:t>
+            </a:r>
+          </a:p>
+        </p:txBody>
+      </p:sp>
+      <p:sp>
+        <p:nvSpPr>
+          <p:cNvPr id="3" name="Content Placeholder 2">
+            <a:extLst>
+              <a:ext uri="{FF2B5EF4-FFF2-40B4-BE49-F238E27FC236}">
+                <a16:creationId xmlns:a16="http://schemas.microsoft.com/office/drawing/2014/main" id="{1BE4D641-4B3A-A443-0655-63E811FC1F35}"/>
+              </a:ext>
+            </a:extLst>
+          </p:cNvPr>
+          <p:cNvSpPr>
+            <a:spLocks noGrp="1"/>
+          </p:cNvSpPr>
+          <p:nvPr>
+            <p:ph idx="1"/>
+          </p:nvPr>
+        </p:nvSpPr>
+        <p:spPr/>
+        <p:txBody>
+          <a:bodyPr/>
+          <a:lstStyle/>
+          <a:p>
+            <a:r>
+              <a:rPr lang="en-CN" dirty="0"/>
+              <a:t>接口</a:t>
+            </a:r>
+          </a:p>
+          <a:p>
+            <a:r>
+              <a:rPr lang="en-CN" dirty="0"/>
+              <a:t>增加</a:t>
+            </a:r>
+          </a:p>
+          <a:p>
+            <a:r>
+              <a:rPr lang="en-CN" dirty="0"/>
+              <a:t>删除</a:t>
+            </a:r>
+          </a:p>
+          <a:p>
+            <a:r>
+              <a:rPr lang="en-CN" dirty="0"/>
+              <a:t>更新</a:t>
+            </a:r>
+          </a:p>
+          <a:p>
+            <a:r>
+              <a:rPr lang="en-CN" dirty="0"/>
+              <a:t>对并发的处理</a:t>
+            </a:r>
+          </a:p>
+        </p:txBody>
+      </p:sp>
+    </p:spTree>
+    <p:extLst>
+      <p:ext uri="{BB962C8B-B14F-4D97-AF65-F5344CB8AC3E}">
+        <p14:creationId xmlns:p14="http://schemas.microsoft.com/office/powerpoint/2010/main" val="675062387"/>
+      </p:ext>
+    </p:extLst>
+  </p:cSld>
+  <p:clrMapOvr>
+    <a:masterClrMapping/>
+  </p:clrMapOvr>
+</p:sld>
+</file>
+
+<file path=ppt/slides/slide7.xml><?xml version="1.0" encoding="utf-8"?>
+<p:sld xmlns:a="http://schemas.openxmlformats.org/drawingml/2006/main" xmlns:r="http://schemas.openxmlformats.org/officeDocument/2006/relationships" xmlns:p="http://schemas.openxmlformats.org/presentationml/2006/main">
+  <p:cSld>
+    <p:spTree>
+      <p:nvGrpSpPr>
+        <p:cNvPr id="1" name=""/>
+        <p:cNvGrpSpPr/>
+        <p:nvPr/>
+      </p:nvGrpSpPr>
+      <p:grpSpPr>
+        <a:xfrm>
+          <a:off x="0" y="0"/>
+          <a:ext cx="0" cy="0"/>
+          <a:chOff x="0" y="0"/>
+          <a:chExt cx="0" cy="0"/>
+        </a:xfrm>
+      </p:grpSpPr>
+      <p:sp>
+        <p:nvSpPr>
+          <p:cNvPr id="2" name="Title 1">
+            <a:extLst>
+              <a:ext uri="{FF2B5EF4-FFF2-40B4-BE49-F238E27FC236}">
+                <a16:creationId xmlns:a16="http://schemas.microsoft.com/office/drawing/2014/main" id="{FF687820-FF18-3053-15FE-55BCEA685EF3}"/>
+              </a:ext>
+            </a:extLst>
+          </p:cNvPr>
+          <p:cNvSpPr>
+            <a:spLocks noGrp="1"/>
+          </p:cNvSpPr>
+          <p:nvPr>
+            <p:ph type="title"/>
+          </p:nvPr>
+        </p:nvSpPr>
+        <p:spPr/>
+        <p:txBody>
+          <a:bodyPr/>
+          <a:lstStyle/>
+          <a:p>
+            <a:r>
+              <a:rPr lang="en-CN" dirty="0"/>
+              <a:t>Flush</a:t>
+            </a:r>
+          </a:p>
+        </p:txBody>
+      </p:sp>
+      <p:sp>
+        <p:nvSpPr>
+          <p:cNvPr id="3" name="Content Placeholder 2">
+            <a:extLst>
+              <a:ext uri="{FF2B5EF4-FFF2-40B4-BE49-F238E27FC236}">
+                <a16:creationId xmlns:a16="http://schemas.microsoft.com/office/drawing/2014/main" id="{2E946DE1-F804-E053-564C-B27D349BD112}"/>
+              </a:ext>
+            </a:extLst>
+          </p:cNvPr>
+          <p:cNvSpPr>
+            <a:spLocks noGrp="1"/>
+          </p:cNvSpPr>
+          <p:nvPr>
+            <p:ph idx="1"/>
+          </p:nvPr>
+        </p:nvSpPr>
+        <p:spPr/>
+        <p:txBody>
+          <a:bodyPr/>
+          <a:lstStyle/>
+          <a:p>
+            <a:r>
+              <a:rPr lang="en-CN" dirty="0"/>
+              <a:t>目的</a:t>
+            </a:r>
+          </a:p>
+          <a:p>
+            <a:r>
+              <a:rPr lang="en-CN" dirty="0"/>
+              <a:t>自动flush</a:t>
+            </a:r>
+          </a:p>
+          <a:p>
+            <a:r>
+              <a:rPr lang="en-CN" dirty="0"/>
+              <a:t>主动flush</a:t>
+            </a:r>
+          </a:p>
+        </p:txBody>
+      </p:sp>
+    </p:spTree>
+    <p:extLst>
+      <p:ext uri="{BB962C8B-B14F-4D97-AF65-F5344CB8AC3E}">
+        <p14:creationId xmlns:p14="http://schemas.microsoft.com/office/powerpoint/2010/main" val="2905025543"/>
+      </p:ext>
+    </p:extLst>
+  </p:cSld>
+  <p:clrMapOvr>
+    <a:masterClrMapping/>
+  </p:clrMapOvr>
+</p:sld>
+</file>
+
+<file path=ppt/slides/slide8.xml><?xml version="1.0" encoding="utf-8"?>
+<p:sld xmlns:a="http://schemas.openxmlformats.org/drawingml/2006/main" xmlns:r="http://schemas.openxmlformats.org/officeDocument/2006/relationships" xmlns:p="http://schemas.openxmlformats.org/presentationml/2006/main">
+  <p:cSld>
+    <p:spTree>
+      <p:nvGrpSpPr>
+        <p:cNvPr id="1" name=""/>
+        <p:cNvGrpSpPr/>
+        <p:nvPr/>
+      </p:nvGrpSpPr>
+      <p:grpSpPr>
+        <a:xfrm>
+          <a:off x="0" y="0"/>
+          <a:ext cx="0" cy="0"/>
+          <a:chOff x="0" y="0"/>
+          <a:chExt cx="0" cy="0"/>
+        </a:xfrm>
+      </p:grpSpPr>
+      <p:sp>
+        <p:nvSpPr>
+          <p:cNvPr id="2" name="Title 1">
+            <a:extLst>
+              <a:ext uri="{FF2B5EF4-FFF2-40B4-BE49-F238E27FC236}">
+                <a16:creationId xmlns:a16="http://schemas.microsoft.com/office/drawing/2014/main" id="{E030BB32-A08F-3526-113E-854A0C2F711C}"/>
+              </a:ext>
+            </a:extLst>
+          </p:cNvPr>
+          <p:cNvSpPr>
+            <a:spLocks noGrp="1"/>
+          </p:cNvSpPr>
+          <p:nvPr>
+            <p:ph type="title"/>
+          </p:nvPr>
+        </p:nvSpPr>
+        <p:spPr/>
+        <p:txBody>
+          <a:bodyPr/>
+          <a:lstStyle/>
+          <a:p>
+            <a:r>
+              <a:rPr lang="en-CN" dirty="0"/>
+              <a:t>Commit</a:t>
+            </a:r>
+          </a:p>
+        </p:txBody>
+      </p:sp>
+      <p:sp>
+        <p:nvSpPr>
+          <p:cNvPr id="3" name="Content Placeholder 2">
+            <a:extLst>
+              <a:ext uri="{FF2B5EF4-FFF2-40B4-BE49-F238E27FC236}">
+                <a16:creationId xmlns:a16="http://schemas.microsoft.com/office/drawing/2014/main" id="{86924E64-F0C6-FA0B-AA6E-78C22E25F687}"/>
+              </a:ext>
+            </a:extLst>
+          </p:cNvPr>
+          <p:cNvSpPr>
+            <a:spLocks noGrp="1"/>
+          </p:cNvSpPr>
+          <p:nvPr>
+            <p:ph idx="1"/>
+          </p:nvPr>
+        </p:nvSpPr>
+        <p:spPr/>
+        <p:txBody>
+          <a:bodyPr/>
+          <a:lstStyle/>
+          <a:p>
+            <a:r>
+              <a:rPr lang="en-CN" dirty="0"/>
+              <a:t>目的</a:t>
+            </a:r>
+          </a:p>
+        </p:txBody>
+      </p:sp>
+    </p:spTree>
+    <p:extLst>
+      <p:ext uri="{BB962C8B-B14F-4D97-AF65-F5344CB8AC3E}">
+        <p14:creationId xmlns:p14="http://schemas.microsoft.com/office/powerpoint/2010/main" val="894406781"/>
+      </p:ext>
+    </p:extLst>
+  </p:cSld>
+  <p:clrMapOvr>
+    <a:masterClrMapping/>
+  </p:clrMapOvr>
+</p:sld>
+</file>
+
+<file path=ppt/slides/slide9.xml><?xml version="1.0" encoding="utf-8"?>
+<p:sld xmlns:a="http://schemas.openxmlformats.org/drawingml/2006/main" xmlns:r="http://schemas.openxmlformats.org/officeDocument/2006/relationships" xmlns:p="http://schemas.openxmlformats.org/presentationml/2006/main">
+  <p:cSld>
+    <p:spTree>
+      <p:nvGrpSpPr>
+        <p:cNvPr id="1" name=""/>
+        <p:cNvGrpSpPr/>
+        <p:nvPr/>
+      </p:nvGrpSpPr>
+      <p:grpSpPr>
+        <a:xfrm>
+          <a:off x="0" y="0"/>
+          <a:ext cx="0" cy="0"/>
+          <a:chOff x="0" y="0"/>
+          <a:chExt cx="0" cy="0"/>
+        </a:xfrm>
+      </p:grpSpPr>
+      <p:sp>
+        <p:nvSpPr>
+          <p:cNvPr id="2" name="Title 1">
+            <a:extLst>
+              <a:ext uri="{FF2B5EF4-FFF2-40B4-BE49-F238E27FC236}">
+                <a16:creationId xmlns:a16="http://schemas.microsoft.com/office/drawing/2014/main" id="{A272B085-3DD3-0715-DDB0-3C49066C2915}"/>
+              </a:ext>
+            </a:extLst>
+          </p:cNvPr>
+          <p:cNvSpPr>
+            <a:spLocks noGrp="1"/>
+          </p:cNvSpPr>
+          <p:nvPr>
+            <p:ph type="title"/>
+          </p:nvPr>
+        </p:nvSpPr>
+        <p:spPr/>
+        <p:txBody>
+          <a:bodyPr/>
+          <a:lstStyle/>
+          <a:p>
+            <a:r>
+              <a:rPr lang="en-CN" dirty="0"/>
+              <a:t>Merge</a:t>
+            </a:r>
+          </a:p>
+        </p:txBody>
+      </p:sp>
+      <p:sp>
+        <p:nvSpPr>
+          <p:cNvPr id="3" name="Content Placeholder 2">
+            <a:extLst>
+              <a:ext uri="{FF2B5EF4-FFF2-40B4-BE49-F238E27FC236}">
+                <a16:creationId xmlns:a16="http://schemas.microsoft.com/office/drawing/2014/main" id="{4C8B0EEE-73C5-A948-9129-C46D33AAC3B7}"/>
+              </a:ext>
+            </a:extLst>
+          </p:cNvPr>
+          <p:cNvSpPr>
+            <a:spLocks noGrp="1"/>
+          </p:cNvSpPr>
+          <p:nvPr>
+            <p:ph idx="1"/>
+          </p:nvPr>
+        </p:nvSpPr>
+        <p:spPr/>
+        <p:txBody>
+          <a:bodyPr/>
+          <a:lstStyle/>
+          <a:p>
+            <a:r>
+              <a:rPr lang="en-CN" dirty="0"/>
+              <a:t>目的</a:t>
+            </a:r>
+          </a:p>
+          <a:p>
+            <a:r>
+              <a:rPr lang="en-CN" dirty="0"/>
+              <a:t>Merge</a:t>
+            </a:r>
+            <a:r>
+              <a:rPr lang="en-US" altLang="zh-CN" dirty="0"/>
+              <a:t>Policy</a:t>
+            </a:r>
+          </a:p>
+          <a:p>
+            <a:r>
+              <a:rPr lang="en-CN" dirty="0"/>
+              <a:t>并发处理</a:t>
+            </a:r>
+          </a:p>
+        </p:txBody>
+      </p:sp>
+    </p:spTree>
+    <p:extLst>
+      <p:ext uri="{BB962C8B-B14F-4D97-AF65-F5344CB8AC3E}">
+        <p14:creationId xmlns:p14="http://schemas.microsoft.com/office/powerpoint/2010/main" val="2928418882"/>
       </p:ext>
     </p:extLst>
   </p:cSld>
@@ -4065,18 +5149,18 @@
         <a:srgbClr val="957A99"/>
       </a:folHlink>
     </a:clrScheme>
-    <a:fontScheme name="Crop">
+    <a:fontScheme name="Calibri">
       <a:majorFont>
-        <a:latin typeface="Franklin Gothic Book" panose="020B0503020102020204"/>
+        <a:latin typeface="Calibri" panose="020F0502020204030204"/>
         <a:ea typeface=""/>
         <a:cs typeface=""/>
         <a:font script="Jpan" typeface="メイリオ"/>
-        <a:font script="Hang" typeface="돋움"/>
-        <a:font script="Hans" typeface="华文楷体"/>
-        <a:font script="Hant" typeface="微軟正黑體"/>
-        <a:font script="Arab" typeface="Tahoma"/>
-        <a:font script="Hebr" typeface="Aharoni"/>
-        <a:font script="Thai" typeface="LilyUPC"/>
+        <a:font script="Hang" typeface="맑은 고딕"/>
+        <a:font script="Hans" typeface="宋体"/>
+        <a:font script="Hant" typeface="新細明體"/>
+        <a:font script="Arab" typeface="Arial"/>
+        <a:font script="Hebr" typeface="Arial"/>
+        <a:font script="Thai" typeface="Cordia New"/>
         <a:font script="Ethi" typeface="Nyala"/>
         <a:font script="Beng" typeface="Vrinda"/>
         <a:font script="Gujr" typeface="Shruti"/>
@@ -4102,16 +5186,16 @@
         <a:font script="Geor" typeface="Sylfaen"/>
       </a:majorFont>
       <a:minorFont>
-        <a:latin typeface="Franklin Gothic Book" panose="020B0503020102020204"/>
+        <a:latin typeface="Calibri" panose="020F0502020204030204"/>
         <a:ea typeface=""/>
         <a:cs typeface=""/>
         <a:font script="Jpan" typeface="メイリオ"/>
-        <a:font script="Hang" typeface="돋움"/>
-        <a:font script="Hans" typeface="华文楷体"/>
-        <a:font script="Hant" typeface="微軟正黑體"/>
-        <a:font script="Arab" typeface="Tahoma"/>
-        <a:font script="Hebr" typeface="Aharoni"/>
-        <a:font script="Thai" typeface="LilyUPC"/>
+        <a:font script="Hang" typeface="맑은 고딕"/>
+        <a:font script="Hans" typeface="宋体"/>
+        <a:font script="Hant" typeface="新細明體"/>
+        <a:font script="Arab" typeface="Arial"/>
+        <a:font script="Hebr" typeface="Arial"/>
+        <a:font script="Thai" typeface="Cordia New"/>
         <a:font script="Ethi" typeface="Nyala"/>
         <a:font script="Beng" typeface="Vrinda"/>
         <a:font script="Gujr" typeface="Shruti"/>

</xml_diff>